<commit_message>
Little changes in presentation.
</commit_message>
<xml_diff>
--- a/presentation/JUnit vs TestNG.pptx
+++ b/presentation/JUnit vs TestNG.pptx
@@ -113,7 +113,7 @@
   </p:defaultTextStyle>
   <p:extLst>
     <p:ext uri="{EFAFB233-063F-42B5-8137-9DF3F51BA10A}">
-      <p15:sldGuideLst xmlns:p15="http://schemas.microsoft.com/office/powerpoint/2012/main"/>
+      <p15:sldGuideLst xmlns:p15="http://schemas.microsoft.com/office/powerpoint/2012/main" xmlns=""/>
     </p:ext>
   </p:extLst>
 </p:presentation>
@@ -844,7 +844,7 @@
             <a:fld id="{B61BEF0D-F0BB-DE4B-95CE-6DB70DBA9567}" type="datetimeFigureOut">
               <a:rPr lang="en-US" dirty="0"/>
               <a:pPr/>
-              <a:t>4/28/2017</a:t>
+              <a:t>6/4/2017</a:t>
             </a:fld>
             <a:endParaRPr lang="en-US" dirty="0"/>
           </a:p>
@@ -1092,7 +1092,7 @@
             <a:fld id="{B61BEF0D-F0BB-DE4B-95CE-6DB70DBA9567}" type="datetimeFigureOut">
               <a:rPr lang="en-US" dirty="0"/>
               <a:pPr/>
-              <a:t>4/28/2017</a:t>
+              <a:t>6/4/2017</a:t>
             </a:fld>
             <a:endParaRPr lang="en-US" dirty="0"/>
           </a:p>
@@ -1403,7 +1403,7 @@
             <a:fld id="{B61BEF0D-F0BB-DE4B-95CE-6DB70DBA9567}" type="datetimeFigureOut">
               <a:rPr lang="en-US" dirty="0"/>
               <a:pPr/>
-              <a:t>4/28/2017</a:t>
+              <a:t>6/4/2017</a:t>
             </a:fld>
             <a:endParaRPr lang="en-US" dirty="0"/>
           </a:p>
@@ -1727,7 +1727,7 @@
             <a:fld id="{B61BEF0D-F0BB-DE4B-95CE-6DB70DBA9567}" type="datetimeFigureOut">
               <a:rPr lang="en-US" dirty="0"/>
               <a:pPr/>
-              <a:t>4/28/2017</a:t>
+              <a:t>6/4/2017</a:t>
             </a:fld>
             <a:endParaRPr lang="en-US" dirty="0"/>
           </a:p>
@@ -2038,7 +2038,7 @@
             <a:fld id="{B61BEF0D-F0BB-DE4B-95CE-6DB70DBA9567}" type="datetimeFigureOut">
               <a:rPr lang="en-US" dirty="0"/>
               <a:pPr/>
-              <a:t>4/28/2017</a:t>
+              <a:t>6/4/2017</a:t>
             </a:fld>
             <a:endParaRPr lang="en-US" dirty="0"/>
           </a:p>
@@ -2422,7 +2422,7 @@
             <a:fld id="{B61BEF0D-F0BB-DE4B-95CE-6DB70DBA9567}" type="datetimeFigureOut">
               <a:rPr lang="en-US" dirty="0"/>
               <a:pPr/>
-              <a:t>4/28/2017</a:t>
+              <a:t>6/4/2017</a:t>
             </a:fld>
             <a:endParaRPr lang="en-US" dirty="0"/>
           </a:p>
@@ -2588,7 +2588,7 @@
           <a:p>
             <a:fld id="{55C6B4A9-1611-4792-9094-5F34BCA07E0B}" type="datetimeFigureOut">
               <a:rPr lang="en-US" dirty="0"/>
-              <a:t>4/28/2017</a:t>
+              <a:t>6/4/2017</a:t>
             </a:fld>
             <a:endParaRPr lang="en-US" dirty="0"/>
           </a:p>
@@ -2764,7 +2764,7 @@
             <a:fld id="{B61BEF0D-F0BB-DE4B-95CE-6DB70DBA9567}" type="datetimeFigureOut">
               <a:rPr lang="en-US" dirty="0"/>
               <a:pPr/>
-              <a:t>4/28/2017</a:t>
+              <a:t>6/4/2017</a:t>
             </a:fld>
             <a:endParaRPr lang="en-US" dirty="0"/>
           </a:p>
@@ -2937,7 +2937,7 @@
             <a:fld id="{B61BEF0D-F0BB-DE4B-95CE-6DB70DBA9567}" type="datetimeFigureOut">
               <a:rPr lang="en-US" dirty="0"/>
               <a:pPr/>
-              <a:t>4/28/2017</a:t>
+              <a:t>6/4/2017</a:t>
             </a:fld>
             <a:endParaRPr lang="en-US" dirty="0"/>
           </a:p>
@@ -3181,7 +3181,7 @@
             <a:fld id="{B61BEF0D-F0BB-DE4B-95CE-6DB70DBA9567}" type="datetimeFigureOut">
               <a:rPr lang="en-US" dirty="0"/>
               <a:pPr/>
-              <a:t>4/28/2017</a:t>
+              <a:t>6/4/2017</a:t>
             </a:fld>
             <a:endParaRPr lang="en-US" dirty="0"/>
           </a:p>
@@ -3409,7 +3409,7 @@
           <a:p>
             <a:fld id="{EB712588-04B1-427B-82EE-E8DB90309F08}" type="datetimeFigureOut">
               <a:rPr lang="en-US" dirty="0"/>
-              <a:t>4/28/2017</a:t>
+              <a:t>6/4/2017</a:t>
             </a:fld>
             <a:endParaRPr lang="en-US" dirty="0"/>
           </a:p>
@@ -3779,7 +3779,7 @@
             <a:fld id="{B61BEF0D-F0BB-DE4B-95CE-6DB70DBA9567}" type="datetimeFigureOut">
               <a:rPr lang="en-US" dirty="0"/>
               <a:pPr/>
-              <a:t>4/28/2017</a:t>
+              <a:t>6/4/2017</a:t>
             </a:fld>
             <a:endParaRPr lang="en-US" dirty="0"/>
           </a:p>
@@ -3899,7 +3899,7 @@
             <a:fld id="{B61BEF0D-F0BB-DE4B-95CE-6DB70DBA9567}" type="datetimeFigureOut">
               <a:rPr lang="en-US" dirty="0"/>
               <a:pPr/>
-              <a:t>4/28/2017</a:t>
+              <a:t>6/4/2017</a:t>
             </a:fld>
             <a:endParaRPr lang="en-US" dirty="0"/>
           </a:p>
@@ -3991,7 +3991,7 @@
             <a:fld id="{B61BEF0D-F0BB-DE4B-95CE-6DB70DBA9567}" type="datetimeFigureOut">
               <a:rPr lang="en-US" dirty="0"/>
               <a:pPr/>
-              <a:t>4/28/2017</a:t>
+              <a:t>6/4/2017</a:t>
             </a:fld>
             <a:endParaRPr lang="en-US" dirty="0"/>
           </a:p>
@@ -4242,7 +4242,7 @@
           <a:p>
             <a:fld id="{42A54C80-263E-416B-A8E0-580EDEADCBDC}" type="datetimeFigureOut">
               <a:rPr lang="en-US" dirty="0"/>
-              <a:t>4/28/2017</a:t>
+              <a:t>6/4/2017</a:t>
             </a:fld>
             <a:endParaRPr lang="en-US" dirty="0"/>
           </a:p>
@@ -4501,7 +4501,7 @@
             <a:fld id="{B61BEF0D-F0BB-DE4B-95CE-6DB70DBA9567}" type="datetimeFigureOut">
               <a:rPr lang="en-US" dirty="0"/>
               <a:pPr/>
-              <a:t>4/28/2017</a:t>
+              <a:t>6/4/2017</a:t>
             </a:fld>
             <a:endParaRPr lang="en-US" dirty="0"/>
           </a:p>
@@ -5243,7 +5243,7 @@
             <a:fld id="{B61BEF0D-F0BB-DE4B-95CE-6DB70DBA9567}" type="datetimeFigureOut">
               <a:rPr lang="en-US" dirty="0"/>
               <a:pPr/>
-              <a:t>4/28/2017</a:t>
+              <a:t>6/4/2017</a:t>
             </a:fld>
             <a:endParaRPr lang="en-US" dirty="0"/>
           </a:p>
@@ -6133,21 +6133,21 @@
                 <a:gridCol w="2865437">
                   <a:extLst>
                     <a:ext uri="{9D8B030D-6E8A-4147-A177-3AD203B41FA5}">
-                      <a16:colId xmlns:a16="http://schemas.microsoft.com/office/drawing/2014/main" val="4139192602"/>
+                      <a16:colId xmlns:a16="http://schemas.microsoft.com/office/drawing/2014/main" xmlns="" val="4139192602"/>
                     </a:ext>
                   </a:extLst>
                 </a:gridCol>
                 <a:gridCol w="2865437">
                   <a:extLst>
                     <a:ext uri="{9D8B030D-6E8A-4147-A177-3AD203B41FA5}">
-                      <a16:colId xmlns:a16="http://schemas.microsoft.com/office/drawing/2014/main" val="2466677177"/>
+                      <a16:colId xmlns:a16="http://schemas.microsoft.com/office/drawing/2014/main" xmlns="" val="2466677177"/>
                     </a:ext>
                   </a:extLst>
                 </a:gridCol>
                 <a:gridCol w="2865437">
                   <a:extLst>
                     <a:ext uri="{9D8B030D-6E8A-4147-A177-3AD203B41FA5}">
-                      <a16:colId xmlns:a16="http://schemas.microsoft.com/office/drawing/2014/main" val="2698854023"/>
+                      <a16:colId xmlns:a16="http://schemas.microsoft.com/office/drawing/2014/main" xmlns="" val="2698854023"/>
                     </a:ext>
                   </a:extLst>
                 </a:gridCol>
@@ -6200,7 +6200,7 @@
                 </a:tc>
                 <a:extLst>
                   <a:ext uri="{0D108BD9-81ED-4DB2-BD59-A6C34878D82A}">
-                    <a16:rowId xmlns:a16="http://schemas.microsoft.com/office/drawing/2014/main" val="2893011562"/>
+                    <a16:rowId xmlns:a16="http://schemas.microsoft.com/office/drawing/2014/main" xmlns="" val="2893011562"/>
                   </a:ext>
                 </a:extLst>
               </a:tr>
@@ -6274,7 +6274,7 @@
                 </a:tc>
                 <a:extLst>
                   <a:ext uri="{0D108BD9-81ED-4DB2-BD59-A6C34878D82A}">
-                    <a16:rowId xmlns:a16="http://schemas.microsoft.com/office/drawing/2014/main" val="3680291117"/>
+                    <a16:rowId xmlns:a16="http://schemas.microsoft.com/office/drawing/2014/main" xmlns="" val="3680291117"/>
                   </a:ext>
                 </a:extLst>
               </a:tr>
@@ -6372,7 +6372,7 @@
                 </a:tc>
                 <a:extLst>
                   <a:ext uri="{0D108BD9-81ED-4DB2-BD59-A6C34878D82A}">
-                    <a16:rowId xmlns:a16="http://schemas.microsoft.com/office/drawing/2014/main" val="2269662899"/>
+                    <a16:rowId xmlns:a16="http://schemas.microsoft.com/office/drawing/2014/main" xmlns="" val="2269662899"/>
                   </a:ext>
                 </a:extLst>
               </a:tr>
@@ -6470,7 +6470,7 @@
                 </a:tc>
                 <a:extLst>
                   <a:ext uri="{0D108BD9-81ED-4DB2-BD59-A6C34878D82A}">
-                    <a16:rowId xmlns:a16="http://schemas.microsoft.com/office/drawing/2014/main" val="3014375684"/>
+                    <a16:rowId xmlns:a16="http://schemas.microsoft.com/office/drawing/2014/main" xmlns="" val="3014375684"/>
                   </a:ext>
                 </a:extLst>
               </a:tr>
@@ -6568,7 +6568,7 @@
                 </a:tc>
                 <a:extLst>
                   <a:ext uri="{0D108BD9-81ED-4DB2-BD59-A6C34878D82A}">
-                    <a16:rowId xmlns:a16="http://schemas.microsoft.com/office/drawing/2014/main" val="2667966585"/>
+                    <a16:rowId xmlns:a16="http://schemas.microsoft.com/office/drawing/2014/main" xmlns="" val="2667966585"/>
                   </a:ext>
                 </a:extLst>
               </a:tr>
@@ -6666,7 +6666,7 @@
                 </a:tc>
                 <a:extLst>
                   <a:ext uri="{0D108BD9-81ED-4DB2-BD59-A6C34878D82A}">
-                    <a16:rowId xmlns:a16="http://schemas.microsoft.com/office/drawing/2014/main" val="1385664742"/>
+                    <a16:rowId xmlns:a16="http://schemas.microsoft.com/office/drawing/2014/main" xmlns="" val="1385664742"/>
                   </a:ext>
                 </a:extLst>
               </a:tr>
@@ -6764,7 +6764,7 @@
                 </a:tc>
                 <a:extLst>
                   <a:ext uri="{0D108BD9-81ED-4DB2-BD59-A6C34878D82A}">
-                    <a16:rowId xmlns:a16="http://schemas.microsoft.com/office/drawing/2014/main" val="4002432223"/>
+                    <a16:rowId xmlns:a16="http://schemas.microsoft.com/office/drawing/2014/main" xmlns="" val="4002432223"/>
                   </a:ext>
                 </a:extLst>
               </a:tr>
@@ -6862,7 +6862,7 @@
                 </a:tc>
                 <a:extLst>
                   <a:ext uri="{0D108BD9-81ED-4DB2-BD59-A6C34878D82A}">
-                    <a16:rowId xmlns:a16="http://schemas.microsoft.com/office/drawing/2014/main" val="831747289"/>
+                    <a16:rowId xmlns:a16="http://schemas.microsoft.com/office/drawing/2014/main" xmlns="" val="831747289"/>
                   </a:ext>
                 </a:extLst>
               </a:tr>
@@ -6953,7 +6953,7 @@
                 </a:tc>
                 <a:extLst>
                   <a:ext uri="{0D108BD9-81ED-4DB2-BD59-A6C34878D82A}">
-                    <a16:rowId xmlns:a16="http://schemas.microsoft.com/office/drawing/2014/main" val="2010278740"/>
+                    <a16:rowId xmlns:a16="http://schemas.microsoft.com/office/drawing/2014/main" xmlns="" val="2010278740"/>
                   </a:ext>
                 </a:extLst>
               </a:tr>
@@ -7044,7 +7044,7 @@
                 </a:tc>
                 <a:extLst>
                   <a:ext uri="{0D108BD9-81ED-4DB2-BD59-A6C34878D82A}">
-                    <a16:rowId xmlns:a16="http://schemas.microsoft.com/office/drawing/2014/main" val="3100205004"/>
+                    <a16:rowId xmlns:a16="http://schemas.microsoft.com/office/drawing/2014/main" xmlns="" val="3100205004"/>
                   </a:ext>
                 </a:extLst>
               </a:tr>
@@ -7135,7 +7135,7 @@
                 </a:tc>
                 <a:extLst>
                   <a:ext uri="{0D108BD9-81ED-4DB2-BD59-A6C34878D82A}">
-                    <a16:rowId xmlns:a16="http://schemas.microsoft.com/office/drawing/2014/main" val="3030281163"/>
+                    <a16:rowId xmlns:a16="http://schemas.microsoft.com/office/drawing/2014/main" xmlns="" val="3030281163"/>
                   </a:ext>
                 </a:extLst>
               </a:tr>
@@ -7226,7 +7226,7 @@
                 </a:tc>
                 <a:extLst>
                   <a:ext uri="{0D108BD9-81ED-4DB2-BD59-A6C34878D82A}">
-                    <a16:rowId xmlns:a16="http://schemas.microsoft.com/office/drawing/2014/main" val="1423220844"/>
+                    <a16:rowId xmlns:a16="http://schemas.microsoft.com/office/drawing/2014/main" xmlns="" val="1423220844"/>
                   </a:ext>
                 </a:extLst>
               </a:tr>
@@ -7320,7 +7320,7 @@
                 </a:tc>
                 <a:extLst>
                   <a:ext uri="{0D108BD9-81ED-4DB2-BD59-A6C34878D82A}">
-                    <a16:rowId xmlns:a16="http://schemas.microsoft.com/office/drawing/2014/main" val="1806437635"/>
+                    <a16:rowId xmlns:a16="http://schemas.microsoft.com/office/drawing/2014/main" xmlns="" val="1806437635"/>
                   </a:ext>
                 </a:extLst>
               </a:tr>
@@ -7434,7 +7434,7 @@
                 </a:tc>
                 <a:extLst>
                   <a:ext uri="{0D108BD9-81ED-4DB2-BD59-A6C34878D82A}">
-                    <a16:rowId xmlns:a16="http://schemas.microsoft.com/office/drawing/2014/main" val="921448611"/>
+                    <a16:rowId xmlns:a16="http://schemas.microsoft.com/office/drawing/2014/main" xmlns="" val="921448611"/>
                   </a:ext>
                 </a:extLst>
               </a:tr>
@@ -7548,7 +7548,7 @@
                 </a:tc>
                 <a:extLst>
                   <a:ext uri="{0D108BD9-81ED-4DB2-BD59-A6C34878D82A}">
-                    <a16:rowId xmlns:a16="http://schemas.microsoft.com/office/drawing/2014/main" val="1970011200"/>
+                    <a16:rowId xmlns:a16="http://schemas.microsoft.com/office/drawing/2014/main" xmlns="" val="1970011200"/>
                   </a:ext>
                 </a:extLst>
               </a:tr>
@@ -17756,11 +17756,7 @@
           <a:p>
             <a:r>
               <a:rPr lang="en-US" dirty="0" smtClean="0"/>
-              <a:t>What is a </a:t>
-            </a:r>
-            <a:r>
-              <a:rPr lang="en-US" dirty="0" smtClean="0"/>
-              <a:t>Mock</a:t>
+              <a:t>What is a Mock</a:t>
             </a:r>
           </a:p>
           <a:p>
@@ -17772,11 +17768,7 @@
           <a:p>
             <a:r>
               <a:rPr lang="en-US" dirty="0" smtClean="0"/>
-              <a:t>Why </a:t>
-            </a:r>
-            <a:r>
-              <a:rPr lang="en-US" dirty="0" smtClean="0"/>
-              <a:t>we need Mocks</a:t>
+              <a:t>Why we need Mocks</a:t>
             </a:r>
             <a:endParaRPr lang="en-US" dirty="0"/>
           </a:p>
@@ -17960,34 +17952,21 @@
             <p:ph type="title"/>
           </p:nvPr>
         </p:nvSpPr>
-        <p:spPr/>
+        <p:spPr>
+          <a:xfrm>
+            <a:off x="677333" y="609600"/>
+            <a:ext cx="8613623" cy="5440136"/>
+          </a:xfrm>
+        </p:spPr>
         <p:txBody>
-          <a:bodyPr/>
+          <a:bodyPr anchor="ctr"/>
           <a:lstStyle/>
           <a:p>
+            <a:pPr algn="ctr"/>
             <a:r>
               <a:rPr lang="en-US" dirty="0" smtClean="0"/>
               <a:t>Questions?</a:t>
             </a:r>
-            <a:endParaRPr lang="en-US" dirty="0"/>
-          </a:p>
-        </p:txBody>
-      </p:sp>
-      <p:sp>
-        <p:nvSpPr>
-          <p:cNvPr id="3" name="Content Placeholder 2"/>
-          <p:cNvSpPr>
-            <a:spLocks noGrp="1"/>
-          </p:cNvSpPr>
-          <p:nvPr>
-            <p:ph idx="1"/>
-          </p:nvPr>
-        </p:nvSpPr>
-        <p:spPr/>
-        <p:txBody>
-          <a:bodyPr/>
-          <a:lstStyle/>
-          <a:p>
             <a:endParaRPr lang="en-US" dirty="0"/>
           </a:p>
         </p:txBody>
@@ -18055,7 +18034,7 @@
     </a:clrScheme>
     <a:fontScheme name="Facet">
       <a:majorFont>
-        <a:latin typeface="Trebuchet MS" panose="020B0603020202020204"/>
+        <a:latin typeface="Trebuchet MS"/>
         <a:ea typeface=""/>
         <a:cs typeface=""/>
         <a:font script="Jpan" typeface="メイリオ"/>
@@ -18090,7 +18069,7 @@
         <a:font script="Geor" typeface="Sylfaen"/>
       </a:majorFont>
       <a:minorFont>
-        <a:latin typeface="Trebuchet MS" panose="020B0603020202020204"/>
+        <a:latin typeface="Trebuchet MS"/>
         <a:ea typeface=""/>
         <a:cs typeface=""/>
         <a:font script="Jpan" typeface="メイリオ"/>
@@ -18263,7 +18242,7 @@
   <a:extraClrSchemeLst/>
   <a:extLst>
     <a:ext uri="{05A4C25C-085E-4340-85A3-A5531E510DB2}">
-      <thm15:themeFamily xmlns:thm15="http://schemas.microsoft.com/office/thememl/2012/main" name="Facet" id="{C0C680CD-088A-49FC-A102-D699147F32B2}" vid="{8C59B386-999D-4CB6-B907-9F3997C027CC}"/>
+      <thm15:themeFamily xmlns:thm15="http://schemas.microsoft.com/office/thememl/2012/main" xmlns="" name="Facet" id="{C0C680CD-088A-49FC-A102-D699147F32B2}" vid="{8C59B386-999D-4CB6-B907-9F3997C027CC}"/>
     </a:ext>
   </a:extLst>
 </a:theme>

</xml_diff>